<commit_message>
add zip file of deliverables
</commit_message>
<xml_diff>
--- a/MSDS_7330_Final_Term_Project.pptx
+++ b/MSDS_7330_Final_Term_Project.pptx
@@ -26931,16 +26931,16 @@
         </p:spPr>
         <p:txBody>
           <a:bodyPr>
-            <a:normAutofit/>
+            <a:normAutofit fontScale="85000" lnSpcReduction="20000"/>
           </a:bodyPr>
           <a:lstStyle/>
           <a:p>
             <a:r>
-              <a:rPr lang="en-US" sz="3200" dirty="0" err="1"/>
+              <a:rPr lang="en-US" sz="2600" dirty="0" err="1"/>
               <a:t>Upsert</a:t>
             </a:r>
             <a:r>
-              <a:rPr lang="en-US" sz="3200" dirty="0"/>
+              <a:rPr lang="en-US" sz="2600" dirty="0"/>
               <a:t> function</a:t>
             </a:r>
           </a:p>
@@ -26949,6 +26949,67 @@
             <a:r>
               <a:rPr lang="en-US" sz="2400" dirty="0"/>
               <a:t>Use this to handle both updates and inserts in the same statement</a:t>
+            </a:r>
+          </a:p>
+          <a:p>
+            <a:r>
+              <a:rPr lang="en-US" sz="2600" dirty="0" err="1"/>
+              <a:t>String.split</a:t>
+            </a:r>
+            <a:r>
+              <a:rPr lang="en-US" sz="2600" dirty="0"/>
+              <a:t>() function</a:t>
+            </a:r>
+          </a:p>
+          <a:p>
+            <a:pPr lvl="1"/>
+            <a:r>
+              <a:rPr lang="en-US" sz="2400" dirty="0"/>
+              <a:t>Flask only handle string, int, float, path and </a:t>
+            </a:r>
+            <a:r>
+              <a:rPr lang="en-US" sz="2400" dirty="0" err="1"/>
+              <a:t>uuid</a:t>
+            </a:r>
+            <a:r>
+              <a:rPr lang="en-US" sz="2400" dirty="0"/>
+              <a:t> variables</a:t>
+            </a:r>
+          </a:p>
+          <a:p>
+            <a:pPr lvl="1"/>
+            <a:r>
+              <a:rPr lang="en-US" sz="2400" dirty="0"/>
+              <a:t>The .split() function is a great work around to generates a list of arguments</a:t>
+            </a:r>
+          </a:p>
+          <a:p>
+            <a:r>
+              <a:rPr lang="en-US" sz="2600" dirty="0"/>
+              <a:t>Spelling Mistakes      </a:t>
+            </a:r>
+          </a:p>
+          <a:p>
+            <a:pPr lvl="1"/>
+            <a:r>
+              <a:rPr lang="en-US" sz="2400" dirty="0"/>
+              <a:t>Could further build database to handle finding reviews with spelling mistakes (i.e., "</a:t>
+            </a:r>
+            <a:r>
+              <a:rPr lang="en-US" sz="2400" dirty="0" err="1"/>
+              <a:t>awesom</a:t>
+            </a:r>
+            <a:r>
+              <a:rPr lang="en-US" sz="2400" dirty="0"/>
+              <a:t>" or "</a:t>
+            </a:r>
+            <a:r>
+              <a:rPr lang="en-US" sz="2400" dirty="0" err="1"/>
+              <a:t>awsome</a:t>
+            </a:r>
+            <a:r>
+              <a:rPr lang="en-US" sz="2400" dirty="0"/>
+              <a:t>") along with the intended word(s) (i.e., "Awesome")</a:t>
             </a:r>
           </a:p>
         </p:txBody>

</xml_diff>